<commit_message>
Uploaded pdf versions of presentations
</commit_message>
<xml_diff>
--- a/presentations/Introduction.pptx
+++ b/presentations/Introduction.pptx
@@ -146,12 +146,12 @@
   <pc:docChgLst>
     <pc:chgData name="Pien, Catarina L" userId="055f424c-5a88-4e6e-9e88-d4462ff2eeee" providerId="ADAL" clId="{E9A59122-B0B6-4620-9E34-C388C0C10CBB}"/>
     <pc:docChg chg="undo custSel addSld delSld modSld sldOrd">
-      <pc:chgData name="Pien, Catarina L" userId="055f424c-5a88-4e6e-9e88-d4462ff2eeee" providerId="ADAL" clId="{E9A59122-B0B6-4620-9E34-C388C0C10CBB}" dt="2024-04-17T23:33:08.200" v="8691" actId="20578"/>
+      <pc:chgData name="Pien, Catarina L" userId="055f424c-5a88-4e6e-9e88-d4462ff2eeee" providerId="ADAL" clId="{E9A59122-B0B6-4620-9E34-C388C0C10CBB}" dt="2024-04-18T15:56:56.426" v="8693" actId="20577"/>
       <pc:docMkLst>
         <pc:docMk/>
       </pc:docMkLst>
       <pc:sldChg chg="addSp delSp modSp mod modNotesTx">
-        <pc:chgData name="Pien, Catarina L" userId="055f424c-5a88-4e6e-9e88-d4462ff2eeee" providerId="ADAL" clId="{E9A59122-B0B6-4620-9E34-C388C0C10CBB}" dt="2024-04-17T22:49:11.692" v="8664" actId="1076"/>
+        <pc:chgData name="Pien, Catarina L" userId="055f424c-5a88-4e6e-9e88-d4462ff2eeee" providerId="ADAL" clId="{E9A59122-B0B6-4620-9E34-C388C0C10CBB}" dt="2024-04-18T15:56:56.426" v="8693" actId="20577"/>
         <pc:sldMkLst>
           <pc:docMk/>
           <pc:sldMk cId="115239938" sldId="256"/>
@@ -25662,7 +25662,7 @@
           <a:p>
             <a:fld id="{82DF76E3-CFCD-49A6-8196-01ADA3FE49E1}" type="datetimeFigureOut">
               <a:rPr lang="en-US" smtClean="0"/>
-              <a:t>4/17/2024</a:t>
+              <a:t>4/18/2024</a:t>
             </a:fld>
             <a:endParaRPr lang="en-US"/>
           </a:p>
@@ -25975,13 +25975,21 @@
           <a:p>
             <a:r>
               <a:rPr lang="en-US" dirty="0"/>
-              <a:t>Welcome to today’s workshop, which we can consider the kickoff of the IEP workshop. </a:t>
+              <a:t>Welcome to </a:t>
+            </a:r>
+            <a:r>
+              <a:rPr lang="en-US"/>
+              <a:t>today’s workshop</a:t>
             </a:r>
           </a:p>
           <a:p>
             <a:r>
+              <a:rPr lang="en-US"/>
+              <a:t>Thanks </a:t>
+            </a:r>
+            <a:r>
               <a:rPr lang="en-US" dirty="0"/>
-              <a:t>Thanks for participating today outside of the regular workshop slot, and we hope this is valuable for everyone.</a:t>
+              <a:t>for participating today outside of the regular workshop slot, and we hope this is valuable for everyone.</a:t>
             </a:r>
           </a:p>
           <a:p>
@@ -27351,7 +27359,7 @@
           <a:p>
             <a:fld id="{F5BF347C-FE83-4D97-87D3-9C7CC64AEC10}" type="datetime1">
               <a:rPr lang="en-US" smtClean="0"/>
-              <a:t>4/17/2024</a:t>
+              <a:t>4/18/2024</a:t>
             </a:fld>
             <a:endParaRPr lang="en-US"/>
           </a:p>
@@ -27549,7 +27557,7 @@
           <a:p>
             <a:fld id="{C63522F0-20BB-41A3-9584-7F6F33EDDCD1}" type="datetime1">
               <a:rPr lang="en-US" smtClean="0"/>
-              <a:t>4/17/2024</a:t>
+              <a:t>4/18/2024</a:t>
             </a:fld>
             <a:endParaRPr lang="en-US"/>
           </a:p>
@@ -27757,7 +27765,7 @@
           <a:p>
             <a:fld id="{62F4ADEF-F6CF-4F30-ACD0-5C6373570C3C}" type="datetime1">
               <a:rPr lang="en-US" smtClean="0"/>
-              <a:t>4/17/2024</a:t>
+              <a:t>4/18/2024</a:t>
             </a:fld>
             <a:endParaRPr lang="en-US"/>
           </a:p>
@@ -27955,7 +27963,7 @@
           <a:p>
             <a:fld id="{57B4E6EA-77CE-49A6-ADF6-9818F58DDE66}" type="datetime1">
               <a:rPr lang="en-US" smtClean="0"/>
-              <a:t>4/17/2024</a:t>
+              <a:t>4/18/2024</a:t>
             </a:fld>
             <a:endParaRPr lang="en-US"/>
           </a:p>
@@ -28230,7 +28238,7 @@
           <a:p>
             <a:fld id="{D594B9ED-B4FE-416F-9ABE-6DC3CF46D4F8}" type="datetime1">
               <a:rPr lang="en-US" smtClean="0"/>
-              <a:t>4/17/2024</a:t>
+              <a:t>4/18/2024</a:t>
             </a:fld>
             <a:endParaRPr lang="en-US"/>
           </a:p>
@@ -28495,7 +28503,7 @@
           <a:p>
             <a:fld id="{3311CD47-A371-4355-81E7-9F02EB6981F3}" type="datetime1">
               <a:rPr lang="en-US" smtClean="0"/>
-              <a:t>4/17/2024</a:t>
+              <a:t>4/18/2024</a:t>
             </a:fld>
             <a:endParaRPr lang="en-US"/>
           </a:p>
@@ -28907,7 +28915,7 @@
           <a:p>
             <a:fld id="{D6503D96-0068-4946-9FC0-8B4F69E0306B}" type="datetime1">
               <a:rPr lang="en-US" smtClean="0"/>
-              <a:t>4/17/2024</a:t>
+              <a:t>4/18/2024</a:t>
             </a:fld>
             <a:endParaRPr lang="en-US"/>
           </a:p>
@@ -29048,7 +29056,7 @@
           <a:p>
             <a:fld id="{6EF55FFA-0960-4DB2-8842-E7D7545ADE0C}" type="datetime1">
               <a:rPr lang="en-US" smtClean="0"/>
-              <a:t>4/17/2024</a:t>
+              <a:t>4/18/2024</a:t>
             </a:fld>
             <a:endParaRPr lang="en-US"/>
           </a:p>
@@ -29161,7 +29169,7 @@
           <a:p>
             <a:fld id="{44317516-184D-4B39-8FF1-C69B9C87DECD}" type="datetime1">
               <a:rPr lang="en-US" smtClean="0"/>
-              <a:t>4/17/2024</a:t>
+              <a:t>4/18/2024</a:t>
             </a:fld>
             <a:endParaRPr lang="en-US"/>
           </a:p>
@@ -29472,7 +29480,7 @@
           <a:p>
             <a:fld id="{28F9B7BD-2C77-4C24-A191-0B4124DAFC85}" type="datetime1">
               <a:rPr lang="en-US" smtClean="0"/>
-              <a:t>4/17/2024</a:t>
+              <a:t>4/18/2024</a:t>
             </a:fld>
             <a:endParaRPr lang="en-US"/>
           </a:p>
@@ -29760,7 +29768,7 @@
           <a:p>
             <a:fld id="{B51FEB5A-798E-4F50-8B52-9913095D8CDF}" type="datetime1">
               <a:rPr lang="en-US" smtClean="0"/>
-              <a:t>4/17/2024</a:t>
+              <a:t>4/18/2024</a:t>
             </a:fld>
             <a:endParaRPr lang="en-US"/>
           </a:p>
@@ -30001,7 +30009,7 @@
           <a:p>
             <a:fld id="{AFAEFFAB-73AF-4731-B4F2-757A3C80A81B}" type="datetime1">
               <a:rPr lang="en-US" smtClean="0"/>
-              <a:t>4/17/2024</a:t>
+              <a:t>4/18/2024</a:t>
             </a:fld>
             <a:endParaRPr lang="en-US"/>
           </a:p>

</xml_diff>